<commit_message>
piccola modifica a presentazione
</commit_message>
<xml_diff>
--- a/Social lending/presentazione AQ apdate/Social lending.pptx
+++ b/Social lending/presentazione AQ apdate/Social lending.pptx
@@ -234,7 +234,7 @@
           <a:p>
             <a:fld id="{59041DB8-B66F-4DC8-A96E-33677E0F90FF}" type="datetimeFigureOut">
               <a:rPr lang="en-US" smtClean="0"/>
-              <a:t>11/11/2017</a:t>
+              <a:t>11/13/2017</a:t>
             </a:fld>
             <a:endParaRPr lang="en-US"/>
           </a:p>
@@ -399,7 +399,7 @@
           <a:p>
             <a:fld id="{DEB49C4A-65AC-492D-9701-81B46C3AD0E4}" type="datetimeFigureOut">
               <a:rPr lang="en-US" smtClean="0"/>
-              <a:t>11/11/2017</a:t>
+              <a:t>11/13/2017</a:t>
             </a:fld>
             <a:endParaRPr lang="en-US"/>
           </a:p>
@@ -3451,7 +3451,7 @@
           <a:p>
             <a:fld id="{384A29A4-78C8-47AB-BA06-22CB45938951}" type="datetime1">
               <a:rPr lang="en-US" smtClean="0"/>
-              <a:t>11/11/2017</a:t>
+              <a:t>11/13/2017</a:t>
             </a:fld>
             <a:endParaRPr lang="en-US"/>
           </a:p>
@@ -3643,7 +3643,7 @@
           <a:p>
             <a:fld id="{E1ED4ACF-2D82-46F2-A8E9-23963AA34E86}" type="datetime1">
               <a:rPr lang="en-US" smtClean="0"/>
-              <a:t>11/11/2017</a:t>
+              <a:t>11/13/2017</a:t>
             </a:fld>
             <a:endParaRPr lang="en-US"/>
           </a:p>
@@ -3825,7 +3825,7 @@
           <a:p>
             <a:fld id="{AE374B5B-21A0-4192-BF4C-38187F1A68D8}" type="datetime1">
               <a:rPr lang="en-US" smtClean="0"/>
-              <a:t>11/11/2017</a:t>
+              <a:t>11/13/2017</a:t>
             </a:fld>
             <a:endParaRPr lang="en-US"/>
           </a:p>
@@ -6165,7 +6165,7 @@
           <a:p>
             <a:fld id="{33B5CF7C-B333-48E1-A4A6-83A3C8B73AC0}" type="datetime1">
               <a:rPr lang="en-US" smtClean="0"/>
-              <a:t>11/11/2017</a:t>
+              <a:t>11/13/2017</a:t>
             </a:fld>
             <a:endParaRPr lang="en-US"/>
           </a:p>
@@ -6617,7 +6617,7 @@
           <a:p>
             <a:fld id="{AE320762-5CBF-4210-AB54-376B091119F8}" type="datetime1">
               <a:rPr lang="en-US" smtClean="0"/>
-              <a:t>11/11/2017</a:t>
+              <a:t>11/13/2017</a:t>
             </a:fld>
             <a:endParaRPr lang="en-US"/>
           </a:p>
@@ -6747,7 +6747,7 @@
           <a:p>
             <a:fld id="{7F0DB371-BF5F-4058-A212-1A908E4D2674}" type="datetime1">
               <a:rPr lang="en-US" smtClean="0"/>
-              <a:t>11/11/2017</a:t>
+              <a:t>11/13/2017</a:t>
             </a:fld>
             <a:endParaRPr lang="en-US"/>
           </a:p>
@@ -8677,7 +8677,7 @@
           <a:p>
             <a:fld id="{60A4083B-90AA-48CF-BAD5-00AA24D7F288}" type="datetime1">
               <a:rPr lang="en-US" smtClean="0"/>
-              <a:t>11/11/2017</a:t>
+              <a:t>11/13/2017</a:t>
             </a:fld>
             <a:endParaRPr lang="en-US"/>
           </a:p>
@@ -10924,7 +10924,7 @@
           <a:p>
             <a:fld id="{F5BAF629-ECA2-4CF3-B790-9D9BDED98269}" type="datetime1">
               <a:rPr lang="en-US" smtClean="0"/>
-              <a:t>11/11/2017</a:t>
+              <a:t>11/13/2017</a:t>
             </a:fld>
             <a:endParaRPr lang="en-US"/>
           </a:p>
@@ -15153,7 +15153,7 @@
           <a:p>
             <a:fld id="{B51B2453-8663-4C69-AF73-9FD7B1DEC5D0}" type="datetime1">
               <a:rPr lang="en-US" smtClean="0"/>
-              <a:t>11/11/2017</a:t>
+              <a:t>11/13/2017</a:t>
             </a:fld>
             <a:endParaRPr lang="en-US"/>
           </a:p>
@@ -15812,6 +15812,13 @@
       </p:transition>
     </mc:Fallback>
   </mc:AlternateContent>
+  <p:timing>
+    <p:tnLst>
+      <p:par>
+        <p:cTn id="1" dur="indefinite" restart="never" nodeType="tmRoot"/>
+      </p:par>
+    </p:tnLst>
+  </p:timing>
 </p:sld>
 </file>
 
@@ -15919,7 +15926,7 @@
           <p:cNvPr id="4" name="Titolo 1">
             <a:extLst>
               <a:ext uri="{FF2B5EF4-FFF2-40B4-BE49-F238E27FC236}">
-                <a16:creationId xmlns:a16="http://schemas.microsoft.com/office/drawing/2014/main" id="{3613C44F-84E8-4EC4-8D0F-C842CF4064A5}"/>
+                <a16:creationId xmlns:a16="http://schemas.microsoft.com/office/drawing/2014/main" xmlns="" id="{3613C44F-84E8-4EC4-8D0F-C842CF4064A5}"/>
               </a:ext>
             </a:extLst>
           </p:cNvPr>
@@ -15994,6 +16001,13 @@
       </p:transition>
     </mc:Fallback>
   </mc:AlternateContent>
+  <p:timing>
+    <p:tnLst>
+      <p:par>
+        <p:cTn id="1" dur="indefinite" restart="never" nodeType="tmRoot"/>
+      </p:par>
+    </p:tnLst>
+  </p:timing>
 </p:sld>
 </file>
 
@@ -16068,7 +16082,7 @@
           <p:cNvPr id="15" name="Immagine 14">
             <a:extLst>
               <a:ext uri="{FF2B5EF4-FFF2-40B4-BE49-F238E27FC236}">
-                <a16:creationId xmlns:a16="http://schemas.microsoft.com/office/drawing/2014/main" id="{00A85155-85CF-429E-97DD-12A72FF16672}"/>
+                <a16:creationId xmlns:a16="http://schemas.microsoft.com/office/drawing/2014/main" xmlns="" id="{00A85155-85CF-429E-97DD-12A72FF16672}"/>
               </a:ext>
             </a:extLst>
           </p:cNvPr>
@@ -16121,7 +16135,7 @@
           <p:cNvPr id="16" name="Titolo 1">
             <a:extLst>
               <a:ext uri="{FF2B5EF4-FFF2-40B4-BE49-F238E27FC236}">
-                <a16:creationId xmlns:a16="http://schemas.microsoft.com/office/drawing/2014/main" id="{6FB521EE-1D11-4D16-ABCC-2537C9940B97}"/>
+                <a16:creationId xmlns:a16="http://schemas.microsoft.com/office/drawing/2014/main" xmlns="" id="{6FB521EE-1D11-4D16-ABCC-2537C9940B97}"/>
               </a:ext>
             </a:extLst>
           </p:cNvPr>
@@ -16177,6 +16191,13 @@
       </p:transition>
     </mc:Fallback>
   </mc:AlternateContent>
+  <p:timing>
+    <p:tnLst>
+      <p:par>
+        <p:cTn id="1" dur="indefinite" restart="never" nodeType="tmRoot"/>
+      </p:par>
+    </p:tnLst>
+  </p:timing>
 </p:sld>
 </file>
 
@@ -16202,7 +16223,7 @@
           <p:cNvPr id="8" name="Immagine 7">
             <a:extLst>
               <a:ext uri="{FF2B5EF4-FFF2-40B4-BE49-F238E27FC236}">
-                <a16:creationId xmlns:a16="http://schemas.microsoft.com/office/drawing/2014/main" id="{370C8557-09CF-40AD-AE1F-90878C0E0D03}"/>
+                <a16:creationId xmlns:a16="http://schemas.microsoft.com/office/drawing/2014/main" xmlns="" id="{370C8557-09CF-40AD-AE1F-90878C0E0D03}"/>
               </a:ext>
             </a:extLst>
           </p:cNvPr>
@@ -18296,7 +18317,7 @@
           <p:cNvPr id="5" name="Immagine 4">
             <a:extLst>
               <a:ext uri="{FF2B5EF4-FFF2-40B4-BE49-F238E27FC236}">
-                <a16:creationId xmlns:a16="http://schemas.microsoft.com/office/drawing/2014/main" id="{049036EC-5576-463A-9CD5-D322E9641E27}"/>
+                <a16:creationId xmlns:a16="http://schemas.microsoft.com/office/drawing/2014/main" xmlns="" id="{049036EC-5576-463A-9CD5-D322E9641E27}"/>
               </a:ext>
             </a:extLst>
           </p:cNvPr>
@@ -20782,7 +20803,7 @@
           <p:cNvPr id="6" name="Immagine 5">
             <a:extLst>
               <a:ext uri="{FF2B5EF4-FFF2-40B4-BE49-F238E27FC236}">
-                <a16:creationId xmlns:a16="http://schemas.microsoft.com/office/drawing/2014/main" id="{8F49A349-9C55-4777-91F7-9E453009338E}"/>
+                <a16:creationId xmlns:a16="http://schemas.microsoft.com/office/drawing/2014/main" xmlns="" id="{8F49A349-9C55-4777-91F7-9E453009338E}"/>
               </a:ext>
             </a:extLst>
           </p:cNvPr>
@@ -22502,7 +22523,7 @@
           <p:cNvPr id="8" name="Gruppo 7">
             <a:extLst>
               <a:ext uri="{FF2B5EF4-FFF2-40B4-BE49-F238E27FC236}">
-                <a16:creationId xmlns:a16="http://schemas.microsoft.com/office/drawing/2014/main" id="{7690CAFF-6C67-4F6F-813D-75B4934FE1C6}"/>
+                <a16:creationId xmlns:a16="http://schemas.microsoft.com/office/drawing/2014/main" xmlns="" id="{7690CAFF-6C67-4F6F-813D-75B4934FE1C6}"/>
               </a:ext>
             </a:extLst>
           </p:cNvPr>
@@ -22522,7 +22543,7 @@
             <p:cNvPr id="6" name="Immagine 5">
               <a:extLst>
                 <a:ext uri="{FF2B5EF4-FFF2-40B4-BE49-F238E27FC236}">
-                  <a16:creationId xmlns:a16="http://schemas.microsoft.com/office/drawing/2014/main" id="{EEEA63E8-B04B-4815-B401-8AC1E8AE062E}"/>
+                  <a16:creationId xmlns:a16="http://schemas.microsoft.com/office/drawing/2014/main" xmlns="" id="{EEEA63E8-B04B-4815-B401-8AC1E8AE062E}"/>
                 </a:ext>
               </a:extLst>
             </p:cNvPr>
@@ -22565,7 +22586,7 @@
             <p:cNvPr id="7" name="Rettangolo 6">
               <a:extLst>
                 <a:ext uri="{FF2B5EF4-FFF2-40B4-BE49-F238E27FC236}">
-                  <a16:creationId xmlns:a16="http://schemas.microsoft.com/office/drawing/2014/main" id="{12AE575D-4FA6-49EA-AC3A-2F0C31EA432F}"/>
+                  <a16:creationId xmlns:a16="http://schemas.microsoft.com/office/drawing/2014/main" xmlns="" id="{12AE575D-4FA6-49EA-AC3A-2F0C31EA432F}"/>
                 </a:ext>
               </a:extLst>
             </p:cNvPr>
@@ -22847,7 +22868,7 @@
               <a:t> sono le repubbliche baltiche (</a:t>
             </a:r>
             <a:r>
-              <a:rPr lang="it-IT" dirty="0" err="1">
+              <a:rPr lang="it-IT" b="1" dirty="0" err="1">
                 <a:solidFill>
                   <a:srgbClr val="2D2E2D"/>
                 </a:solidFill>
@@ -22856,7 +22877,7 @@
               <a:t>mintos</a:t>
             </a:r>
             <a:r>
-              <a:rPr lang="it-IT" dirty="0">
+              <a:rPr lang="it-IT" b="1" dirty="0">
                 <a:solidFill>
                   <a:srgbClr val="2D2E2D"/>
                 </a:solidFill>
@@ -22865,7 +22886,7 @@
               <a:t>, </a:t>
             </a:r>
             <a:r>
-              <a:rPr lang="it-IT" dirty="0" err="1">
+              <a:rPr lang="it-IT" b="1" dirty="0" err="1">
                 <a:solidFill>
                   <a:srgbClr val="2D2E2D"/>
                 </a:solidFill>
@@ -22874,7 +22895,7 @@
               <a:t>twino</a:t>
             </a:r>
             <a:r>
-              <a:rPr lang="it-IT" dirty="0">
+              <a:rPr lang="it-IT" b="1" dirty="0">
                 <a:solidFill>
                   <a:srgbClr val="2D2E2D"/>
                 </a:solidFill>
@@ -22883,7 +22904,7 @@
               <a:t>, </a:t>
             </a:r>
             <a:r>
-              <a:rPr lang="it-IT" dirty="0" err="1">
+              <a:rPr lang="it-IT" b="1" dirty="0" err="1">
                 <a:solidFill>
                   <a:srgbClr val="2D2E2D"/>
                 </a:solidFill>
@@ -22892,7 +22913,7 @@
               <a:t>bondora</a:t>
             </a:r>
             <a:r>
-              <a:rPr lang="it-IT" dirty="0">
+              <a:rPr lang="it-IT" b="1" dirty="0" smtClean="0">
                 <a:solidFill>
                   <a:srgbClr val="2D2E2D"/>
                 </a:solidFill>
@@ -22900,51 +22921,11 @@
               </a:rPr>
               <a:t>…)</a:t>
             </a:r>
-          </a:p>
-          <a:p>
-            <a:pPr marL="228600" indent="-228600" algn="l" defTabSz="914400">
-              <a:lnSpc>
-                <a:spcPct val="90000"/>
-              </a:lnSpc>
-              <a:spcBef>
-                <a:spcPts val="1800"/>
-              </a:spcBef>
-              <a:buClr>
-                <a:srgbClr val="D15A3E"/>
-              </a:buClr>
-              <a:buSzPct val="100000"/>
-              <a:buFont typeface="Arial"/>
-              <a:buChar char="▪"/>
-            </a:pPr>
-            <a:r>
-              <a:rPr lang="it-IT" sz="2000" b="0" i="0" dirty="0">
-                <a:solidFill>
-                  <a:srgbClr val="2D2E2D"/>
-                </a:solidFill>
-                <a:latin typeface="Arial"/>
-                <a:ea typeface="+mn-ea"/>
-                <a:cs typeface="+mn-cs"/>
-              </a:rPr>
-              <a:t>Rendimenti tassati in base a scaglione </a:t>
-            </a:r>
-            <a:r>
-              <a:rPr lang="it-IT" sz="2000" b="0" i="0" dirty="0" err="1">
-                <a:solidFill>
-                  <a:srgbClr val="2D2E2D"/>
-                </a:solidFill>
-                <a:latin typeface="Arial"/>
-                <a:ea typeface="+mn-ea"/>
-                <a:cs typeface="+mn-cs"/>
-              </a:rPr>
-              <a:t>irpef</a:t>
-            </a:r>
-            <a:endParaRPr lang="it-IT" sz="2000" b="0" i="0" dirty="0">
+            <a:endParaRPr lang="it-IT" b="1" dirty="0">
               <a:solidFill>
                 <a:srgbClr val="2D2E2D"/>
               </a:solidFill>
               <a:latin typeface="Arial"/>
-              <a:ea typeface="+mn-ea"/>
-              <a:cs typeface="+mn-cs"/>
             </a:endParaRPr>
           </a:p>
         </p:txBody>
@@ -25100,362 +25081,6 @@
                                           <p:spTgt spid="3">
                                             <p:txEl>
                                               <p:pRg st="5" end="5"/>
-                                            </p:txEl>
-                                          </p:spTgt>
-                                        </p:tgtEl>
-                                      </p:cBhvr>
-                                      <p:to x="100000" y="100000"/>
-                                    </p:animScale>
-                                  </p:childTnLst>
-                                </p:cTn>
-                              </p:par>
-                            </p:childTnLst>
-                          </p:cTn>
-                        </p:par>
-                      </p:childTnLst>
-                    </p:cTn>
-                  </p:par>
-                  <p:par>
-                    <p:cTn id="111" fill="hold">
-                      <p:stCondLst>
-                        <p:cond delay="indefinite"/>
-                      </p:stCondLst>
-                      <p:childTnLst>
-                        <p:par>
-                          <p:cTn id="112" fill="hold">
-                            <p:stCondLst>
-                              <p:cond delay="0"/>
-                            </p:stCondLst>
-                            <p:childTnLst>
-                              <p:par>
-                                <p:cTn id="113" presetID="26" presetClass="entr" presetSubtype="0" fill="hold" grpId="0" nodeType="clickEffect">
-                                  <p:stCondLst>
-                                    <p:cond delay="0"/>
-                                  </p:stCondLst>
-                                  <p:childTnLst>
-                                    <p:set>
-                                      <p:cBhvr>
-                                        <p:cTn id="114" dur="1" fill="hold">
-                                          <p:stCondLst>
-                                            <p:cond delay="0"/>
-                                          </p:stCondLst>
-                                        </p:cTn>
-                                        <p:tgtEl>
-                                          <p:spTgt spid="3">
-                                            <p:txEl>
-                                              <p:pRg st="6" end="6"/>
-                                            </p:txEl>
-                                          </p:spTgt>
-                                        </p:tgtEl>
-                                        <p:attrNameLst>
-                                          <p:attrName>style.visibility</p:attrName>
-                                        </p:attrNameLst>
-                                      </p:cBhvr>
-                                      <p:to>
-                                        <p:strVal val="visible"/>
-                                      </p:to>
-                                    </p:set>
-                                    <p:animEffect transition="in" filter="wipe(down)">
-                                      <p:cBhvr>
-                                        <p:cTn id="115" dur="580">
-                                          <p:stCondLst>
-                                            <p:cond delay="0"/>
-                                          </p:stCondLst>
-                                        </p:cTn>
-                                        <p:tgtEl>
-                                          <p:spTgt spid="3">
-                                            <p:txEl>
-                                              <p:pRg st="6" end="6"/>
-                                            </p:txEl>
-                                          </p:spTgt>
-                                        </p:tgtEl>
-                                      </p:cBhvr>
-                                    </p:animEffect>
-                                    <p:anim calcmode="lin" valueType="num">
-                                      <p:cBhvr>
-                                        <p:cTn id="116" dur="1822" tmFilter="0,0; 0.14,0.36; 0.43,0.73; 0.71,0.91; 1.0,1.0">
-                                          <p:stCondLst>
-                                            <p:cond delay="0"/>
-                                          </p:stCondLst>
-                                        </p:cTn>
-                                        <p:tgtEl>
-                                          <p:spTgt spid="3">
-                                            <p:txEl>
-                                              <p:pRg st="6" end="6"/>
-                                            </p:txEl>
-                                          </p:spTgt>
-                                        </p:tgtEl>
-                                        <p:attrNameLst>
-                                          <p:attrName>ppt_x</p:attrName>
-                                        </p:attrNameLst>
-                                      </p:cBhvr>
-                                      <p:tavLst>
-                                        <p:tav tm="0">
-                                          <p:val>
-                                            <p:strVal val="#ppt_x-0.25"/>
-                                          </p:val>
-                                        </p:tav>
-                                        <p:tav tm="100000">
-                                          <p:val>
-                                            <p:strVal val="#ppt_x"/>
-                                          </p:val>
-                                        </p:tav>
-                                      </p:tavLst>
-                                    </p:anim>
-                                    <p:anim calcmode="lin" valueType="num">
-                                      <p:cBhvr>
-                                        <p:cTn id="117" dur="664" tmFilter="0.0,0.0; 0.25,0.07; 0.50,0.2; 0.75,0.467; 1.0,1.0">
-                                          <p:stCondLst>
-                                            <p:cond delay="0"/>
-                                          </p:stCondLst>
-                                        </p:cTn>
-                                        <p:tgtEl>
-                                          <p:spTgt spid="3">
-                                            <p:txEl>
-                                              <p:pRg st="6" end="6"/>
-                                            </p:txEl>
-                                          </p:spTgt>
-                                        </p:tgtEl>
-                                        <p:attrNameLst>
-                                          <p:attrName>ppt_y</p:attrName>
-                                        </p:attrNameLst>
-                                      </p:cBhvr>
-                                      <p:tavLst>
-                                        <p:tav tm="0" fmla="#ppt_y-sin(pi*$)/3">
-                                          <p:val>
-                                            <p:fltVal val="0.5"/>
-                                          </p:val>
-                                        </p:tav>
-                                        <p:tav tm="100000">
-                                          <p:val>
-                                            <p:fltVal val="1"/>
-                                          </p:val>
-                                        </p:tav>
-                                      </p:tavLst>
-                                    </p:anim>
-                                    <p:anim calcmode="lin" valueType="num">
-                                      <p:cBhvr>
-                                        <p:cTn id="118" dur="664" tmFilter="0, 0; 0.125,0.2665; 0.25,0.4; 0.375,0.465; 0.5,0.5;  0.625,0.535; 0.75,0.6; 0.875,0.7335; 1,1">
-                                          <p:stCondLst>
-                                            <p:cond delay="664"/>
-                                          </p:stCondLst>
-                                        </p:cTn>
-                                        <p:tgtEl>
-                                          <p:spTgt spid="3">
-                                            <p:txEl>
-                                              <p:pRg st="6" end="6"/>
-                                            </p:txEl>
-                                          </p:spTgt>
-                                        </p:tgtEl>
-                                        <p:attrNameLst>
-                                          <p:attrName>ppt_y</p:attrName>
-                                        </p:attrNameLst>
-                                      </p:cBhvr>
-                                      <p:tavLst>
-                                        <p:tav tm="0" fmla="#ppt_y-sin(pi*$)/9">
-                                          <p:val>
-                                            <p:fltVal val="0"/>
-                                          </p:val>
-                                        </p:tav>
-                                        <p:tav tm="100000">
-                                          <p:val>
-                                            <p:fltVal val="1"/>
-                                          </p:val>
-                                        </p:tav>
-                                      </p:tavLst>
-                                    </p:anim>
-                                    <p:anim calcmode="lin" valueType="num">
-                                      <p:cBhvr>
-                                        <p:cTn id="119" dur="332" tmFilter="0, 0; 0.125,0.2665; 0.25,0.4; 0.375,0.465; 0.5,0.5;  0.625,0.535; 0.75,0.6; 0.875,0.7335; 1,1">
-                                          <p:stCondLst>
-                                            <p:cond delay="1324"/>
-                                          </p:stCondLst>
-                                        </p:cTn>
-                                        <p:tgtEl>
-                                          <p:spTgt spid="3">
-                                            <p:txEl>
-                                              <p:pRg st="6" end="6"/>
-                                            </p:txEl>
-                                          </p:spTgt>
-                                        </p:tgtEl>
-                                        <p:attrNameLst>
-                                          <p:attrName>ppt_y</p:attrName>
-                                        </p:attrNameLst>
-                                      </p:cBhvr>
-                                      <p:tavLst>
-                                        <p:tav tm="0" fmla="#ppt_y-sin(pi*$)/27">
-                                          <p:val>
-                                            <p:fltVal val="0"/>
-                                          </p:val>
-                                        </p:tav>
-                                        <p:tav tm="100000">
-                                          <p:val>
-                                            <p:fltVal val="1"/>
-                                          </p:val>
-                                        </p:tav>
-                                      </p:tavLst>
-                                    </p:anim>
-                                    <p:anim calcmode="lin" valueType="num">
-                                      <p:cBhvr>
-                                        <p:cTn id="120" dur="164" tmFilter="0, 0; 0.125,0.2665; 0.25,0.4; 0.375,0.465; 0.5,0.5;  0.625,0.535; 0.75,0.6; 0.875,0.7335; 1,1">
-                                          <p:stCondLst>
-                                            <p:cond delay="1656"/>
-                                          </p:stCondLst>
-                                        </p:cTn>
-                                        <p:tgtEl>
-                                          <p:spTgt spid="3">
-                                            <p:txEl>
-                                              <p:pRg st="6" end="6"/>
-                                            </p:txEl>
-                                          </p:spTgt>
-                                        </p:tgtEl>
-                                        <p:attrNameLst>
-                                          <p:attrName>ppt_y</p:attrName>
-                                        </p:attrNameLst>
-                                      </p:cBhvr>
-                                      <p:tavLst>
-                                        <p:tav tm="0" fmla="#ppt_y-sin(pi*$)/81">
-                                          <p:val>
-                                            <p:fltVal val="0"/>
-                                          </p:val>
-                                        </p:tav>
-                                        <p:tav tm="100000">
-                                          <p:val>
-                                            <p:fltVal val="1"/>
-                                          </p:val>
-                                        </p:tav>
-                                      </p:tavLst>
-                                    </p:anim>
-                                    <p:animScale>
-                                      <p:cBhvr>
-                                        <p:cTn id="121" dur="26">
-                                          <p:stCondLst>
-                                            <p:cond delay="650"/>
-                                          </p:stCondLst>
-                                        </p:cTn>
-                                        <p:tgtEl>
-                                          <p:spTgt spid="3">
-                                            <p:txEl>
-                                              <p:pRg st="6" end="6"/>
-                                            </p:txEl>
-                                          </p:spTgt>
-                                        </p:tgtEl>
-                                      </p:cBhvr>
-                                      <p:to x="100000" y="60000"/>
-                                    </p:animScale>
-                                    <p:animScale>
-                                      <p:cBhvr>
-                                        <p:cTn id="122" dur="166" decel="50000">
-                                          <p:stCondLst>
-                                            <p:cond delay="676"/>
-                                          </p:stCondLst>
-                                        </p:cTn>
-                                        <p:tgtEl>
-                                          <p:spTgt spid="3">
-                                            <p:txEl>
-                                              <p:pRg st="6" end="6"/>
-                                            </p:txEl>
-                                          </p:spTgt>
-                                        </p:tgtEl>
-                                      </p:cBhvr>
-                                      <p:to x="100000" y="100000"/>
-                                    </p:animScale>
-                                    <p:animScale>
-                                      <p:cBhvr>
-                                        <p:cTn id="123" dur="26">
-                                          <p:stCondLst>
-                                            <p:cond delay="1312"/>
-                                          </p:stCondLst>
-                                        </p:cTn>
-                                        <p:tgtEl>
-                                          <p:spTgt spid="3">
-                                            <p:txEl>
-                                              <p:pRg st="6" end="6"/>
-                                            </p:txEl>
-                                          </p:spTgt>
-                                        </p:tgtEl>
-                                      </p:cBhvr>
-                                      <p:to x="100000" y="80000"/>
-                                    </p:animScale>
-                                    <p:animScale>
-                                      <p:cBhvr>
-                                        <p:cTn id="124" dur="166" decel="50000">
-                                          <p:stCondLst>
-                                            <p:cond delay="1338"/>
-                                          </p:stCondLst>
-                                        </p:cTn>
-                                        <p:tgtEl>
-                                          <p:spTgt spid="3">
-                                            <p:txEl>
-                                              <p:pRg st="6" end="6"/>
-                                            </p:txEl>
-                                          </p:spTgt>
-                                        </p:tgtEl>
-                                      </p:cBhvr>
-                                      <p:to x="100000" y="100000"/>
-                                    </p:animScale>
-                                    <p:animScale>
-                                      <p:cBhvr>
-                                        <p:cTn id="125" dur="26">
-                                          <p:stCondLst>
-                                            <p:cond delay="1642"/>
-                                          </p:stCondLst>
-                                        </p:cTn>
-                                        <p:tgtEl>
-                                          <p:spTgt spid="3">
-                                            <p:txEl>
-                                              <p:pRg st="6" end="6"/>
-                                            </p:txEl>
-                                          </p:spTgt>
-                                        </p:tgtEl>
-                                      </p:cBhvr>
-                                      <p:to x="100000" y="90000"/>
-                                    </p:animScale>
-                                    <p:animScale>
-                                      <p:cBhvr>
-                                        <p:cTn id="126" dur="166" decel="50000">
-                                          <p:stCondLst>
-                                            <p:cond delay="1668"/>
-                                          </p:stCondLst>
-                                        </p:cTn>
-                                        <p:tgtEl>
-                                          <p:spTgt spid="3">
-                                            <p:txEl>
-                                              <p:pRg st="6" end="6"/>
-                                            </p:txEl>
-                                          </p:spTgt>
-                                        </p:tgtEl>
-                                      </p:cBhvr>
-                                      <p:to x="100000" y="100000"/>
-                                    </p:animScale>
-                                    <p:animScale>
-                                      <p:cBhvr>
-                                        <p:cTn id="127" dur="26">
-                                          <p:stCondLst>
-                                            <p:cond delay="1808"/>
-                                          </p:stCondLst>
-                                        </p:cTn>
-                                        <p:tgtEl>
-                                          <p:spTgt spid="3">
-                                            <p:txEl>
-                                              <p:pRg st="6" end="6"/>
-                                            </p:txEl>
-                                          </p:spTgt>
-                                        </p:tgtEl>
-                                      </p:cBhvr>
-                                      <p:to x="100000" y="95000"/>
-                                    </p:animScale>
-                                    <p:animScale>
-                                      <p:cBhvr>
-                                        <p:cTn id="128" dur="166" decel="50000">
-                                          <p:stCondLst>
-                                            <p:cond delay="1834"/>
-                                          </p:stCondLst>
-                                        </p:cTn>
-                                        <p:tgtEl>
-                                          <p:spTgt spid="3">
-                                            <p:txEl>
-                                              <p:pRg st="6" end="6"/>
                                             </p:txEl>
                                           </p:spTgt>
                                         </p:tgtEl>
@@ -25545,7 +25170,7 @@
           <p:cNvPr id="9" name="Immagine 8">
             <a:extLst>
               <a:ext uri="{FF2B5EF4-FFF2-40B4-BE49-F238E27FC236}">
-                <a16:creationId xmlns:a16="http://schemas.microsoft.com/office/drawing/2014/main" id="{25FEEBD2-E360-4492-8E9C-582ECBB4E8B3}"/>
+                <a16:creationId xmlns:a16="http://schemas.microsoft.com/office/drawing/2014/main" xmlns="" id="{25FEEBD2-E360-4492-8E9C-582ECBB4E8B3}"/>
               </a:ext>
             </a:extLst>
           </p:cNvPr>
@@ -25583,7 +25208,7 @@
           <p:cNvPr id="10" name="Bolla: nuvola 9">
             <a:extLst>
               <a:ext uri="{FF2B5EF4-FFF2-40B4-BE49-F238E27FC236}">
-                <a16:creationId xmlns:a16="http://schemas.microsoft.com/office/drawing/2014/main" id="{9626C771-6CFA-49B3-AD02-93A09522A7B0}"/>
+                <a16:creationId xmlns:a16="http://schemas.microsoft.com/office/drawing/2014/main" xmlns="" id="{9626C771-6CFA-49B3-AD02-93A09522A7B0}"/>
               </a:ext>
             </a:extLst>
           </p:cNvPr>
@@ -25635,7 +25260,7 @@
           <p:cNvPr id="11" name="Bolla: nuvola 10">
             <a:extLst>
               <a:ext uri="{FF2B5EF4-FFF2-40B4-BE49-F238E27FC236}">
-                <a16:creationId xmlns:a16="http://schemas.microsoft.com/office/drawing/2014/main" id="{4CF2D4B3-50BD-41F8-9B49-1E7F68C13FE9}"/>
+                <a16:creationId xmlns:a16="http://schemas.microsoft.com/office/drawing/2014/main" xmlns="" id="{4CF2D4B3-50BD-41F8-9B49-1E7F68C13FE9}"/>
               </a:ext>
             </a:extLst>
           </p:cNvPr>
@@ -25687,7 +25312,7 @@
           <p:cNvPr id="12" name="Bolla: nuvola 11">
             <a:extLst>
               <a:ext uri="{FF2B5EF4-FFF2-40B4-BE49-F238E27FC236}">
-                <a16:creationId xmlns:a16="http://schemas.microsoft.com/office/drawing/2014/main" id="{DDBAD4FB-5D24-4C71-A7F7-7795884D6547}"/>
+                <a16:creationId xmlns:a16="http://schemas.microsoft.com/office/drawing/2014/main" xmlns="" id="{DDBAD4FB-5D24-4C71-A7F7-7795884D6547}"/>
               </a:ext>
             </a:extLst>
           </p:cNvPr>
@@ -26169,7 +25794,7 @@
           <p:cNvPr id="9" name="Immagine 8">
             <a:extLst>
               <a:ext uri="{FF2B5EF4-FFF2-40B4-BE49-F238E27FC236}">
-                <a16:creationId xmlns:a16="http://schemas.microsoft.com/office/drawing/2014/main" id="{23085D06-AE12-4410-8CA1-016506D0281F}"/>
+                <a16:creationId xmlns:a16="http://schemas.microsoft.com/office/drawing/2014/main" xmlns="" id="{23085D06-AE12-4410-8CA1-016506D0281F}"/>
               </a:ext>
             </a:extLst>
           </p:cNvPr>
@@ -26207,7 +25832,7 @@
           <p:cNvPr id="10" name="Titolo 1">
             <a:extLst>
               <a:ext uri="{FF2B5EF4-FFF2-40B4-BE49-F238E27FC236}">
-                <a16:creationId xmlns:a16="http://schemas.microsoft.com/office/drawing/2014/main" id="{CC0B761B-6764-46A6-ACD3-6383EA6F8D19}"/>
+                <a16:creationId xmlns:a16="http://schemas.microsoft.com/office/drawing/2014/main" xmlns="" id="{CC0B761B-6764-46A6-ACD3-6383EA6F8D19}"/>
               </a:ext>
             </a:extLst>
           </p:cNvPr>
@@ -26261,7 +25886,7 @@
           <p:cNvPr id="11" name="Titolo 1">
             <a:extLst>
               <a:ext uri="{FF2B5EF4-FFF2-40B4-BE49-F238E27FC236}">
-                <a16:creationId xmlns:a16="http://schemas.microsoft.com/office/drawing/2014/main" id="{F287DA1E-C1EA-4219-9A06-813AE6E56E6F}"/>
+                <a16:creationId xmlns:a16="http://schemas.microsoft.com/office/drawing/2014/main" xmlns="" id="{F287DA1E-C1EA-4219-9A06-813AE6E56E6F}"/>
               </a:ext>
             </a:extLst>
           </p:cNvPr>
@@ -26332,6 +25957,13 @@
       </p:transition>
     </mc:Fallback>
   </mc:AlternateContent>
+  <p:timing>
+    <p:tnLst>
+      <p:par>
+        <p:cTn id="1" dur="indefinite" restart="never" nodeType="tmRoot"/>
+      </p:par>
+    </p:tnLst>
+  </p:timing>
 </p:sld>
 </file>
 
@@ -27305,7 +26937,7 @@
           <p:cNvPr id="7" name="Gruppo 6">
             <a:extLst>
               <a:ext uri="{FF2B5EF4-FFF2-40B4-BE49-F238E27FC236}">
-                <a16:creationId xmlns:a16="http://schemas.microsoft.com/office/drawing/2014/main" id="{CDB54253-7C86-475C-83DC-A9AEF85E6FD4}"/>
+                <a16:creationId xmlns:a16="http://schemas.microsoft.com/office/drawing/2014/main" xmlns="" id="{CDB54253-7C86-475C-83DC-A9AEF85E6FD4}"/>
               </a:ext>
             </a:extLst>
           </p:cNvPr>
@@ -29430,6 +29062,13 @@
       </p:transition>
     </mc:Fallback>
   </mc:AlternateContent>
+  <p:timing>
+    <p:tnLst>
+      <p:par>
+        <p:cTn id="1" dur="indefinite" restart="never" nodeType="tmRoot"/>
+      </p:par>
+    </p:tnLst>
+  </p:timing>
 </p:sld>
 </file>
 
@@ -29577,7 +29216,7 @@
           <p:cNvPr id="3" name="Gruppo 2">
             <a:extLst>
               <a:ext uri="{FF2B5EF4-FFF2-40B4-BE49-F238E27FC236}">
-                <a16:creationId xmlns:a16="http://schemas.microsoft.com/office/drawing/2014/main" id="{52E6003D-CAFE-4D71-94A2-8A23ECE4C848}"/>
+                <a16:creationId xmlns:a16="http://schemas.microsoft.com/office/drawing/2014/main" xmlns="" id="{52E6003D-CAFE-4D71-94A2-8A23ECE4C848}"/>
               </a:ext>
             </a:extLst>
           </p:cNvPr>
@@ -30214,6 +29853,13 @@
       </p:transition>
     </mc:Fallback>
   </mc:AlternateContent>
+  <p:timing>
+    <p:tnLst>
+      <p:par>
+        <p:cTn id="1" dur="indefinite" restart="never" nodeType="tmRoot"/>
+      </p:par>
+    </p:tnLst>
+  </p:timing>
 </p:sld>
 </file>
 
@@ -30426,6 +30072,13 @@
       </p:transition>
     </mc:Fallback>
   </mc:AlternateContent>
+  <p:timing>
+    <p:tnLst>
+      <p:par>
+        <p:cTn id="1" dur="indefinite" restart="never" nodeType="tmRoot"/>
+      </p:par>
+    </p:tnLst>
+  </p:timing>
 </p:sld>
 </file>
 

</xml_diff>

<commit_message>
aggiunta la cartella lezioni di inglese
</commit_message>
<xml_diff>
--- a/Social lending/presentazione AQ apdate/Social lending.pptx
+++ b/Social lending/presentazione AQ apdate/Social lending.pptx
@@ -15719,13 +15719,26 @@
               <a:rPr lang="it-IT" dirty="0"/>
             </a:br>
             <a:r>
-              <a:rPr lang="it-IT" dirty="0">
+              <a:rPr lang="it-IT">
                 <a:solidFill>
                   <a:srgbClr val="E48312"/>
                 </a:solidFill>
               </a:rPr>
-              <a:t>SOCIAL LENDINGS</a:t>
+              <a:t>SOCIAL </a:t>
             </a:r>
+            <a:r>
+              <a:rPr lang="it-IT" smtClean="0">
+                <a:solidFill>
+                  <a:srgbClr val="E48312"/>
+                </a:solidFill>
+              </a:rPr>
+              <a:t>LENDING</a:t>
+            </a:r>
+            <a:endParaRPr lang="it-IT" dirty="0">
+              <a:solidFill>
+                <a:srgbClr val="E48312"/>
+              </a:solidFill>
+            </a:endParaRPr>
           </a:p>
         </p:txBody>
       </p:sp>
@@ -15926,7 +15939,7 @@
           <p:cNvPr id="4" name="Titolo 1">
             <a:extLst>
               <a:ext uri="{FF2B5EF4-FFF2-40B4-BE49-F238E27FC236}">
-                <a16:creationId xmlns:a16="http://schemas.microsoft.com/office/drawing/2014/main" xmlns="" id="{3613C44F-84E8-4EC4-8D0F-C842CF4064A5}"/>
+                <a16:creationId xmlns="" xmlns:a16="http://schemas.microsoft.com/office/drawing/2014/main" id="{3613C44F-84E8-4EC4-8D0F-C842CF4064A5}"/>
               </a:ext>
             </a:extLst>
           </p:cNvPr>
@@ -16082,7 +16095,7 @@
           <p:cNvPr id="15" name="Immagine 14">
             <a:extLst>
               <a:ext uri="{FF2B5EF4-FFF2-40B4-BE49-F238E27FC236}">
-                <a16:creationId xmlns:a16="http://schemas.microsoft.com/office/drawing/2014/main" xmlns="" id="{00A85155-85CF-429E-97DD-12A72FF16672}"/>
+                <a16:creationId xmlns="" xmlns:a16="http://schemas.microsoft.com/office/drawing/2014/main" id="{00A85155-85CF-429E-97DD-12A72FF16672}"/>
               </a:ext>
             </a:extLst>
           </p:cNvPr>
@@ -16135,7 +16148,7 @@
           <p:cNvPr id="16" name="Titolo 1">
             <a:extLst>
               <a:ext uri="{FF2B5EF4-FFF2-40B4-BE49-F238E27FC236}">
-                <a16:creationId xmlns:a16="http://schemas.microsoft.com/office/drawing/2014/main" xmlns="" id="{6FB521EE-1D11-4D16-ABCC-2537C9940B97}"/>
+                <a16:creationId xmlns="" xmlns:a16="http://schemas.microsoft.com/office/drawing/2014/main" id="{6FB521EE-1D11-4D16-ABCC-2537C9940B97}"/>
               </a:ext>
             </a:extLst>
           </p:cNvPr>
@@ -16223,7 +16236,7 @@
           <p:cNvPr id="8" name="Immagine 7">
             <a:extLst>
               <a:ext uri="{FF2B5EF4-FFF2-40B4-BE49-F238E27FC236}">
-                <a16:creationId xmlns:a16="http://schemas.microsoft.com/office/drawing/2014/main" xmlns="" id="{370C8557-09CF-40AD-AE1F-90878C0E0D03}"/>
+                <a16:creationId xmlns="" xmlns:a16="http://schemas.microsoft.com/office/drawing/2014/main" id="{370C8557-09CF-40AD-AE1F-90878C0E0D03}"/>
               </a:ext>
             </a:extLst>
           </p:cNvPr>
@@ -18317,7 +18330,7 @@
           <p:cNvPr id="5" name="Immagine 4">
             <a:extLst>
               <a:ext uri="{FF2B5EF4-FFF2-40B4-BE49-F238E27FC236}">
-                <a16:creationId xmlns:a16="http://schemas.microsoft.com/office/drawing/2014/main" xmlns="" id="{049036EC-5576-463A-9CD5-D322E9641E27}"/>
+                <a16:creationId xmlns="" xmlns:a16="http://schemas.microsoft.com/office/drawing/2014/main" id="{049036EC-5576-463A-9CD5-D322E9641E27}"/>
               </a:ext>
             </a:extLst>
           </p:cNvPr>
@@ -20803,7 +20816,7 @@
           <p:cNvPr id="6" name="Immagine 5">
             <a:extLst>
               <a:ext uri="{FF2B5EF4-FFF2-40B4-BE49-F238E27FC236}">
-                <a16:creationId xmlns:a16="http://schemas.microsoft.com/office/drawing/2014/main" xmlns="" id="{8F49A349-9C55-4777-91F7-9E453009338E}"/>
+                <a16:creationId xmlns="" xmlns:a16="http://schemas.microsoft.com/office/drawing/2014/main" id="{8F49A349-9C55-4777-91F7-9E453009338E}"/>
               </a:ext>
             </a:extLst>
           </p:cNvPr>
@@ -22523,7 +22536,7 @@
           <p:cNvPr id="8" name="Gruppo 7">
             <a:extLst>
               <a:ext uri="{FF2B5EF4-FFF2-40B4-BE49-F238E27FC236}">
-                <a16:creationId xmlns:a16="http://schemas.microsoft.com/office/drawing/2014/main" xmlns="" id="{7690CAFF-6C67-4F6F-813D-75B4934FE1C6}"/>
+                <a16:creationId xmlns="" xmlns:a16="http://schemas.microsoft.com/office/drawing/2014/main" id="{7690CAFF-6C67-4F6F-813D-75B4934FE1C6}"/>
               </a:ext>
             </a:extLst>
           </p:cNvPr>
@@ -22543,7 +22556,7 @@
             <p:cNvPr id="6" name="Immagine 5">
               <a:extLst>
                 <a:ext uri="{FF2B5EF4-FFF2-40B4-BE49-F238E27FC236}">
-                  <a16:creationId xmlns:a16="http://schemas.microsoft.com/office/drawing/2014/main" xmlns="" id="{EEEA63E8-B04B-4815-B401-8AC1E8AE062E}"/>
+                  <a16:creationId xmlns="" xmlns:a16="http://schemas.microsoft.com/office/drawing/2014/main" id="{EEEA63E8-B04B-4815-B401-8AC1E8AE062E}"/>
                 </a:ext>
               </a:extLst>
             </p:cNvPr>
@@ -22586,7 +22599,7 @@
             <p:cNvPr id="7" name="Rettangolo 6">
               <a:extLst>
                 <a:ext uri="{FF2B5EF4-FFF2-40B4-BE49-F238E27FC236}">
-                  <a16:creationId xmlns:a16="http://schemas.microsoft.com/office/drawing/2014/main" xmlns="" id="{12AE575D-4FA6-49EA-AC3A-2F0C31EA432F}"/>
+                  <a16:creationId xmlns="" xmlns:a16="http://schemas.microsoft.com/office/drawing/2014/main" id="{12AE575D-4FA6-49EA-AC3A-2F0C31EA432F}"/>
                 </a:ext>
               </a:extLst>
             </p:cNvPr>
@@ -25170,7 +25183,7 @@
           <p:cNvPr id="9" name="Immagine 8">
             <a:extLst>
               <a:ext uri="{FF2B5EF4-FFF2-40B4-BE49-F238E27FC236}">
-                <a16:creationId xmlns:a16="http://schemas.microsoft.com/office/drawing/2014/main" xmlns="" id="{25FEEBD2-E360-4492-8E9C-582ECBB4E8B3}"/>
+                <a16:creationId xmlns="" xmlns:a16="http://schemas.microsoft.com/office/drawing/2014/main" id="{25FEEBD2-E360-4492-8E9C-582ECBB4E8B3}"/>
               </a:ext>
             </a:extLst>
           </p:cNvPr>
@@ -25208,7 +25221,7 @@
           <p:cNvPr id="10" name="Bolla: nuvola 9">
             <a:extLst>
               <a:ext uri="{FF2B5EF4-FFF2-40B4-BE49-F238E27FC236}">
-                <a16:creationId xmlns:a16="http://schemas.microsoft.com/office/drawing/2014/main" xmlns="" id="{9626C771-6CFA-49B3-AD02-93A09522A7B0}"/>
+                <a16:creationId xmlns="" xmlns:a16="http://schemas.microsoft.com/office/drawing/2014/main" id="{9626C771-6CFA-49B3-AD02-93A09522A7B0}"/>
               </a:ext>
             </a:extLst>
           </p:cNvPr>
@@ -25260,7 +25273,7 @@
           <p:cNvPr id="11" name="Bolla: nuvola 10">
             <a:extLst>
               <a:ext uri="{FF2B5EF4-FFF2-40B4-BE49-F238E27FC236}">
-                <a16:creationId xmlns:a16="http://schemas.microsoft.com/office/drawing/2014/main" xmlns="" id="{4CF2D4B3-50BD-41F8-9B49-1E7F68C13FE9}"/>
+                <a16:creationId xmlns="" xmlns:a16="http://schemas.microsoft.com/office/drawing/2014/main" id="{4CF2D4B3-50BD-41F8-9B49-1E7F68C13FE9}"/>
               </a:ext>
             </a:extLst>
           </p:cNvPr>
@@ -25312,7 +25325,7 @@
           <p:cNvPr id="12" name="Bolla: nuvola 11">
             <a:extLst>
               <a:ext uri="{FF2B5EF4-FFF2-40B4-BE49-F238E27FC236}">
-                <a16:creationId xmlns:a16="http://schemas.microsoft.com/office/drawing/2014/main" xmlns="" id="{DDBAD4FB-5D24-4C71-A7F7-7795884D6547}"/>
+                <a16:creationId xmlns="" xmlns:a16="http://schemas.microsoft.com/office/drawing/2014/main" id="{DDBAD4FB-5D24-4C71-A7F7-7795884D6547}"/>
               </a:ext>
             </a:extLst>
           </p:cNvPr>
@@ -25794,7 +25807,7 @@
           <p:cNvPr id="9" name="Immagine 8">
             <a:extLst>
               <a:ext uri="{FF2B5EF4-FFF2-40B4-BE49-F238E27FC236}">
-                <a16:creationId xmlns:a16="http://schemas.microsoft.com/office/drawing/2014/main" xmlns="" id="{23085D06-AE12-4410-8CA1-016506D0281F}"/>
+                <a16:creationId xmlns="" xmlns:a16="http://schemas.microsoft.com/office/drawing/2014/main" id="{23085D06-AE12-4410-8CA1-016506D0281F}"/>
               </a:ext>
             </a:extLst>
           </p:cNvPr>
@@ -25832,7 +25845,7 @@
           <p:cNvPr id="10" name="Titolo 1">
             <a:extLst>
               <a:ext uri="{FF2B5EF4-FFF2-40B4-BE49-F238E27FC236}">
-                <a16:creationId xmlns:a16="http://schemas.microsoft.com/office/drawing/2014/main" xmlns="" id="{CC0B761B-6764-46A6-ACD3-6383EA6F8D19}"/>
+                <a16:creationId xmlns="" xmlns:a16="http://schemas.microsoft.com/office/drawing/2014/main" id="{CC0B761B-6764-46A6-ACD3-6383EA6F8D19}"/>
               </a:ext>
             </a:extLst>
           </p:cNvPr>
@@ -25886,7 +25899,7 @@
           <p:cNvPr id="11" name="Titolo 1">
             <a:extLst>
               <a:ext uri="{FF2B5EF4-FFF2-40B4-BE49-F238E27FC236}">
-                <a16:creationId xmlns:a16="http://schemas.microsoft.com/office/drawing/2014/main" xmlns="" id="{F287DA1E-C1EA-4219-9A06-813AE6E56E6F}"/>
+                <a16:creationId xmlns="" xmlns:a16="http://schemas.microsoft.com/office/drawing/2014/main" id="{F287DA1E-C1EA-4219-9A06-813AE6E56E6F}"/>
               </a:ext>
             </a:extLst>
           </p:cNvPr>
@@ -26937,7 +26950,7 @@
           <p:cNvPr id="7" name="Gruppo 6">
             <a:extLst>
               <a:ext uri="{FF2B5EF4-FFF2-40B4-BE49-F238E27FC236}">
-                <a16:creationId xmlns:a16="http://schemas.microsoft.com/office/drawing/2014/main" xmlns="" id="{CDB54253-7C86-475C-83DC-A9AEF85E6FD4}"/>
+                <a16:creationId xmlns="" xmlns:a16="http://schemas.microsoft.com/office/drawing/2014/main" id="{CDB54253-7C86-475C-83DC-A9AEF85E6FD4}"/>
               </a:ext>
             </a:extLst>
           </p:cNvPr>
@@ -29216,7 +29229,7 @@
           <p:cNvPr id="3" name="Gruppo 2">
             <a:extLst>
               <a:ext uri="{FF2B5EF4-FFF2-40B4-BE49-F238E27FC236}">
-                <a16:creationId xmlns:a16="http://schemas.microsoft.com/office/drawing/2014/main" xmlns="" id="{52E6003D-CAFE-4D71-94A2-8A23ECE4C848}"/>
+                <a16:creationId xmlns="" xmlns:a16="http://schemas.microsoft.com/office/drawing/2014/main" id="{52E6003D-CAFE-4D71-94A2-8A23ECE4C848}"/>
               </a:ext>
             </a:extLst>
           </p:cNvPr>

</xml_diff>